<commit_message>
updated esercizi db, conversioni e HTML
</commit_message>
<xml_diff>
--- a/lezioni/dati_e_informazioni/materiale/lezione_2_file.pptx
+++ b/lezioni/dati_e_informazioni/materiale/lezione_2_file.pptx
@@ -3398,7 +3398,7 @@
           <a:p>
             <a:fld id="{01B887F7-3F99-4366-BC3E-7FB889EF431F}" type="datetimeFigureOut">
               <a:rPr lang="it-IT" smtClean="0"/>
-              <a:t>19/10/2023</a:t>
+              <a:t>10/12/2024</a:t>
             </a:fld>
             <a:endParaRPr lang="it-IT"/>
           </a:p>
@@ -3577,7 +3577,7 @@
           <a:p>
             <a:fld id="{01B887F7-3F99-4366-BC3E-7FB889EF431F}" type="datetimeFigureOut">
               <a:rPr lang="it-IT" smtClean="0"/>
-              <a:t>19/10/2023</a:t>
+              <a:t>10/12/2024</a:t>
             </a:fld>
             <a:endParaRPr lang="it-IT"/>
           </a:p>
@@ -3757,7 +3757,7 @@
           <a:p>
             <a:fld id="{01B887F7-3F99-4366-BC3E-7FB889EF431F}" type="datetimeFigureOut">
               <a:rPr lang="it-IT" smtClean="0"/>
-              <a:t>19/10/2023</a:t>
+              <a:t>10/12/2024</a:t>
             </a:fld>
             <a:endParaRPr lang="it-IT"/>
           </a:p>
@@ -3927,7 +3927,7 @@
           <a:p>
             <a:fld id="{01B887F7-3F99-4366-BC3E-7FB889EF431F}" type="datetimeFigureOut">
               <a:rPr lang="it-IT" smtClean="0"/>
-              <a:t>19/10/2023</a:t>
+              <a:t>10/12/2024</a:t>
             </a:fld>
             <a:endParaRPr lang="it-IT"/>
           </a:p>
@@ -4240,7 +4240,7 @@
           <a:p>
             <a:fld id="{01B887F7-3F99-4366-BC3E-7FB889EF431F}" type="datetimeFigureOut">
               <a:rPr lang="it-IT" smtClean="0"/>
-              <a:t>19/10/2023</a:t>
+              <a:t>10/12/2024</a:t>
             </a:fld>
             <a:endParaRPr lang="it-IT"/>
           </a:p>
@@ -4626,7 +4626,7 @@
           <a:p>
             <a:fld id="{01B887F7-3F99-4366-BC3E-7FB889EF431F}" type="datetimeFigureOut">
               <a:rPr lang="it-IT" smtClean="0"/>
-              <a:t>19/10/2023</a:t>
+              <a:t>10/12/2024</a:t>
             </a:fld>
             <a:endParaRPr lang="it-IT"/>
           </a:p>
@@ -5060,7 +5060,7 @@
           <a:p>
             <a:fld id="{01B887F7-3F99-4366-BC3E-7FB889EF431F}" type="datetimeFigureOut">
               <a:rPr lang="it-IT" smtClean="0"/>
-              <a:t>19/10/2023</a:t>
+              <a:t>10/12/2024</a:t>
             </a:fld>
             <a:endParaRPr lang="it-IT"/>
           </a:p>
@@ -5178,7 +5178,7 @@
           <a:p>
             <a:fld id="{01B887F7-3F99-4366-BC3E-7FB889EF431F}" type="datetimeFigureOut">
               <a:rPr lang="it-IT" smtClean="0"/>
-              <a:t>19/10/2023</a:t>
+              <a:t>10/12/2024</a:t>
             </a:fld>
             <a:endParaRPr lang="it-IT"/>
           </a:p>
@@ -5273,7 +5273,7 @@
           <a:p>
             <a:fld id="{01B887F7-3F99-4366-BC3E-7FB889EF431F}" type="datetimeFigureOut">
               <a:rPr lang="it-IT" smtClean="0"/>
-              <a:t>19/10/2023</a:t>
+              <a:t>10/12/2024</a:t>
             </a:fld>
             <a:endParaRPr lang="it-IT"/>
           </a:p>
@@ -5623,7 +5623,7 @@
           <a:p>
             <a:fld id="{01B887F7-3F99-4366-BC3E-7FB889EF431F}" type="datetimeFigureOut">
               <a:rPr lang="it-IT" smtClean="0"/>
-              <a:t>19/10/2023</a:t>
+              <a:t>10/12/2024</a:t>
             </a:fld>
             <a:endParaRPr lang="it-IT"/>
           </a:p>
@@ -6048,7 +6048,7 @@
           <a:p>
             <a:fld id="{01B887F7-3F99-4366-BC3E-7FB889EF431F}" type="datetimeFigureOut">
               <a:rPr lang="it-IT" smtClean="0"/>
-              <a:t>19/10/2023</a:t>
+              <a:t>10/12/2024</a:t>
             </a:fld>
             <a:endParaRPr lang="it-IT"/>
           </a:p>
@@ -6329,7 +6329,7 @@
           <a:p>
             <a:fld id="{01B887F7-3F99-4366-BC3E-7FB889EF431F}" type="datetimeFigureOut">
               <a:rPr lang="it-IT" smtClean="0"/>
-              <a:t>19/10/2023</a:t>
+              <a:t>10/12/2024</a:t>
             </a:fld>
             <a:endParaRPr lang="it-IT"/>
           </a:p>
@@ -11676,8 +11676,8 @@
           </a:extLst>
         </p:spPr>
       </p:pic>
-      <mc:AlternateContent xmlns:mc="http://schemas.openxmlformats.org/markup-compatibility/2006">
-        <mc:Choice xmlns:a14="http://schemas.microsoft.com/office/drawing/2010/main" Requires="a14">
+      <mc:AlternateContent xmlns:mc="http://schemas.openxmlformats.org/markup-compatibility/2006" xmlns:a14="http://schemas.microsoft.com/office/drawing/2010/main">
+        <mc:Choice Requires="a14">
           <p:sp>
             <p:nvSpPr>
               <p:cNvPr id="10" name="CasellaDiTesto 9">
@@ -11760,6 +11760,7 @@
                 <a:endParaRPr lang="it-IT" dirty="0"/>
               </a:p>
               <a:p>
+                <a:pPr/>
                 <a14:m>
                   <m:oMathPara xmlns:m="http://schemas.openxmlformats.org/officeDocument/2006/math">
                     <m:oMathParaPr>
@@ -11904,7 +11905,7 @@
             </p:txBody>
           </p:sp>
         </mc:Choice>
-        <mc:Fallback>
+        <mc:Fallback xmlns="">
           <p:sp>
             <p:nvSpPr>
               <p:cNvPr id="10" name="CasellaDiTesto 9">
@@ -12252,7 +12253,7 @@
           <p:nvPr>
             <p:extLst>
               <p:ext uri="{D42A27DB-BD31-4B8C-83A1-F6EECF244321}">
-                <p14:modId xmlns:p14="http://schemas.microsoft.com/office/powerpoint/2010/main" val="2008563144"/>
+                <p14:modId xmlns:p14="http://schemas.microsoft.com/office/powerpoint/2010/main" val="2610235592"/>
               </p:ext>
             </p:extLst>
           </p:nvPr>
@@ -12404,7 +12405,7 @@
                     <a:p>
                       <a:r>
                         <a:rPr lang="it-IT" dirty="0"/>
-                        <a:t>2^4 = 8 colori</a:t>
+                        <a:t>2^4 = 16 colori</a:t>
                       </a:r>
                     </a:p>
                   </a:txBody>

</xml_diff>